<commit_message>
Minor updates on the HLA.
</commit_message>
<xml_diff>
--- a/RepoDb.Wiki/Files/HLA.pptx
+++ b/RepoDb.Wiki/Files/HLA.pptx
@@ -2950,6 +2950,14 @@
 <file path=ppt/slides/slide1.xml><?xml version="1.0" encoding="utf-8"?>
 <p:sld xmlns:a="http://schemas.openxmlformats.org/drawingml/2006/main" xmlns:r="http://schemas.openxmlformats.org/officeDocument/2006/relationships" xmlns:p="http://schemas.openxmlformats.org/presentationml/2006/main">
   <p:cSld>
+    <p:bg>
+      <p:bgPr>
+        <a:solidFill>
+          <a:schemeClr val="bg1"/>
+        </a:solidFill>
+        <a:effectLst/>
+      </p:bgPr>
+    </p:bg>
     <p:spTree>
       <p:nvGrpSpPr>
         <p:cNvPr id="1" name=""/>
@@ -3322,14 +3330,14 @@
           <a:p>
             <a:pPr algn="ctr"/>
             <a:r>
-              <a:rPr lang="en-US" sz="900" dirty="0" err="1" smtClean="0">
+              <a:rPr lang="en-US" sz="900" b="1" dirty="0" err="1" smtClean="0">
                 <a:solidFill>
                   <a:schemeClr val="tx1"/>
                 </a:solidFill>
               </a:rPr>
               <a:t>IDbConnection</a:t>
             </a:r>
-            <a:endParaRPr lang="en-US" sz="900" dirty="0">
+            <a:endParaRPr lang="en-US" sz="900" b="1" dirty="0">
               <a:solidFill>
                 <a:schemeClr val="tx1"/>
               </a:solidFill>
@@ -3387,14 +3395,14 @@
           <a:p>
             <a:pPr algn="ctr"/>
             <a:r>
-              <a:rPr lang="en-US" sz="900" dirty="0" err="1" smtClean="0">
+              <a:rPr lang="en-US" sz="900" b="1" dirty="0" err="1" smtClean="0">
                 <a:solidFill>
                   <a:schemeClr val="tx1"/>
                 </a:solidFill>
               </a:rPr>
               <a:t>DbRepository</a:t>
             </a:r>
-            <a:endParaRPr lang="en-US" sz="900" dirty="0">
+            <a:endParaRPr lang="en-US" sz="900" b="1" dirty="0">
               <a:solidFill>
                 <a:schemeClr val="tx1"/>
               </a:solidFill>
@@ -3484,14 +3492,14 @@
           <a:p>
             <a:pPr algn="ctr"/>
             <a:r>
-              <a:rPr lang="en-US" sz="900" dirty="0" err="1" smtClean="0">
+              <a:rPr lang="en-US" sz="900" b="1" dirty="0" err="1" smtClean="0">
                 <a:solidFill>
                   <a:schemeClr val="tx1"/>
                 </a:solidFill>
               </a:rPr>
               <a:t>BaseRepository</a:t>
             </a:r>
-            <a:endParaRPr lang="en-US" sz="900" dirty="0">
+            <a:endParaRPr lang="en-US" sz="900" b="1" dirty="0">
               <a:solidFill>
                 <a:schemeClr val="tx1"/>
               </a:solidFill>
@@ -3513,7 +3521,7 @@
                   <a:schemeClr val="tx1"/>
                 </a:solidFill>
               </a:rPr>
-              <a:t>Tentity</a:t>
+              <a:t>TEntity</a:t>
             </a:r>
             <a:r>
               <a:rPr lang="en-US" sz="900" dirty="0" smtClean="0">
@@ -3592,14 +3600,14 @@
           <a:p>
             <a:pPr algn="ctr"/>
             <a:r>
-              <a:rPr lang="en-US" sz="900" dirty="0" err="1" smtClean="0">
+              <a:rPr lang="en-US" sz="900" b="1" dirty="0" err="1" smtClean="0">
                 <a:solidFill>
                   <a:schemeClr val="tx1"/>
                 </a:solidFill>
               </a:rPr>
               <a:t>ITrace</a:t>
             </a:r>
-            <a:endParaRPr lang="en-US" sz="900" dirty="0">
+            <a:endParaRPr lang="en-US" sz="900" b="1" dirty="0">
               <a:solidFill>
                 <a:schemeClr val="tx1"/>
               </a:solidFill>
@@ -3716,14 +3724,14 @@
           <a:p>
             <a:pPr algn="ctr"/>
             <a:r>
-              <a:rPr lang="en-US" sz="900" dirty="0" err="1" smtClean="0">
+              <a:rPr lang="en-US" sz="900" b="1" dirty="0" err="1" smtClean="0">
                 <a:solidFill>
                   <a:schemeClr val="tx1"/>
                 </a:solidFill>
               </a:rPr>
               <a:t>IDbOperationProvider</a:t>
             </a:r>
-            <a:endParaRPr lang="en-US" sz="900" dirty="0" smtClean="0">
+            <a:endParaRPr lang="en-US" sz="900" b="1" dirty="0" smtClean="0">
               <a:solidFill>
                 <a:schemeClr val="tx1"/>
               </a:solidFill>
@@ -4184,14 +4192,14 @@
           <a:p>
             <a:pPr algn="ctr"/>
             <a:r>
-              <a:rPr lang="en-US" sz="900" dirty="0" err="1" smtClean="0">
+              <a:rPr lang="en-US" sz="900" b="1" dirty="0" err="1" smtClean="0">
                 <a:solidFill>
                   <a:schemeClr val="tx1"/>
                 </a:solidFill>
               </a:rPr>
               <a:t>IStamentBuilder</a:t>
             </a:r>
-            <a:endParaRPr lang="en-US" sz="900" dirty="0" smtClean="0">
+            <a:endParaRPr lang="en-US" sz="900" b="1" dirty="0" smtClean="0">
               <a:solidFill>
                 <a:schemeClr val="tx1"/>
               </a:solidFill>
@@ -4308,14 +4316,14 @@
           <a:p>
             <a:pPr algn="ctr"/>
             <a:r>
-              <a:rPr lang="en-US" sz="900" dirty="0" err="1" smtClean="0">
+              <a:rPr lang="en-US" sz="900" b="1" dirty="0" err="1" smtClean="0">
                 <a:solidFill>
                   <a:schemeClr val="tx1"/>
                 </a:solidFill>
               </a:rPr>
               <a:t>ICache</a:t>
             </a:r>
-            <a:endParaRPr lang="en-US" sz="900" dirty="0">
+            <a:endParaRPr lang="en-US" sz="900" b="1" dirty="0">
               <a:solidFill>
                 <a:schemeClr val="tx1"/>
               </a:solidFill>
@@ -4432,14 +4440,14 @@
           <a:p>
             <a:pPr algn="ctr"/>
             <a:r>
-              <a:rPr lang="en-US" sz="900" dirty="0" err="1" smtClean="0">
+              <a:rPr lang="en-US" sz="900" b="1" dirty="0" err="1" smtClean="0">
                 <a:solidFill>
                   <a:schemeClr val="tx1"/>
                 </a:solidFill>
               </a:rPr>
               <a:t>IDbHelper</a:t>
             </a:r>
-            <a:endParaRPr lang="en-US" sz="900" dirty="0">
+            <a:endParaRPr lang="en-US" sz="900" b="1" dirty="0">
               <a:solidFill>
                 <a:schemeClr val="tx1"/>
               </a:solidFill>
@@ -4683,14 +4691,14 @@
           <a:p>
             <a:pPr algn="ctr"/>
             <a:r>
-              <a:rPr lang="en-US" sz="900" dirty="0" err="1" smtClean="0">
+              <a:rPr lang="en-US" sz="900" b="1" dirty="0" err="1" smtClean="0">
                 <a:solidFill>
                   <a:schemeClr val="tx1"/>
                 </a:solidFill>
               </a:rPr>
               <a:t>IResolver</a:t>
             </a:r>
-            <a:endParaRPr lang="en-US" sz="900" dirty="0" smtClean="0">
+            <a:endParaRPr lang="en-US" sz="900" b="1" dirty="0" smtClean="0">
               <a:solidFill>
                 <a:schemeClr val="tx1"/>
               </a:solidFill>

</xml_diff>

<commit_message>
Minor updates to HLA Image
</commit_message>
<xml_diff>
--- a/RepoDb.Wiki/Files/HLA.pptx
+++ b/RepoDb.Wiki/Files/HLA.pptx
@@ -104,6 +104,11 @@
       </a:defRPr>
     </a:lvl9pPr>
   </p:defaultTextStyle>
+  <p:extLst>
+    <p:ext uri="{EFAFB233-063F-42B5-8137-9DF3F51BA10A}">
+      <p15:sldGuideLst xmlns:p15="http://schemas.microsoft.com/office/powerpoint/2012/main"/>
+    </p:ext>
+  </p:extLst>
 </p:presentation>
 </file>
 
@@ -2974,31 +2979,68 @@
       </p:grpSpPr>
       <p:sp>
         <p:nvSpPr>
+          <p:cNvPr id="2" name="Rectangle 1"/>
+          <p:cNvSpPr/>
+          <p:nvPr/>
+        </p:nvSpPr>
+        <p:spPr>
+          <a:xfrm>
+            <a:off x="1247775" y="571498"/>
+            <a:ext cx="9839325" cy="5757863"/>
+          </a:xfrm>
+          <a:prstGeom prst="rect">
+            <a:avLst/>
+          </a:prstGeom>
+          <a:ln>
+            <a:prstDash val="dash"/>
+          </a:ln>
+        </p:spPr>
+        <p:style>
+          <a:lnRef idx="2">
+            <a:schemeClr val="dk1"/>
+          </a:lnRef>
+          <a:fillRef idx="1">
+            <a:schemeClr val="lt1"/>
+          </a:fillRef>
+          <a:effectRef idx="0">
+            <a:schemeClr val="dk1"/>
+          </a:effectRef>
+          <a:fontRef idx="minor">
+            <a:schemeClr val="dk1"/>
+          </a:fontRef>
+        </p:style>
+        <p:txBody>
+          <a:bodyPr rtlCol="0" anchor="ctr"/>
+          <a:lstStyle/>
+          <a:p>
+            <a:pPr algn="ctr"/>
+            <a:endParaRPr lang="en-US"/>
+          </a:p>
+        </p:txBody>
+      </p:sp>
+      <p:sp>
+        <p:nvSpPr>
           <p:cNvPr id="4" name="Flowchart: Magnetic Disk 3"/>
           <p:cNvSpPr/>
           <p:nvPr/>
         </p:nvSpPr>
         <p:spPr>
           <a:xfrm>
-            <a:off x="6352992" y="5601222"/>
-            <a:ext cx="1237550" cy="597593"/>
+            <a:off x="5529612" y="5283920"/>
+            <a:ext cx="1237550" cy="874340"/>
           </a:xfrm>
           <a:prstGeom prst="flowChartMagneticDisk">
             <a:avLst/>
           </a:prstGeom>
-          <a:solidFill>
-            <a:schemeClr val="accent1">
-              <a:lumMod val="20000"/>
-              <a:lumOff val="80000"/>
-            </a:schemeClr>
-          </a:solidFill>
-          <a:ln w="9525">
+          <a:noFill/>
+          <a:ln w="12700">
             <a:solidFill>
-              <a:schemeClr val="bg1">
-                <a:lumMod val="50000"/>
+              <a:schemeClr val="tx1">
+                <a:lumMod val="95000"/>
+                <a:lumOff val="5000"/>
               </a:schemeClr>
             </a:solidFill>
-            <a:prstDash val="dash"/>
+            <a:prstDash val="solid"/>
           </a:ln>
           <a:effectLst/>
         </p:spPr>
@@ -3027,7 +3069,66 @@
                   <a:schemeClr val="tx1"/>
                 </a:solidFill>
               </a:rPr>
-              <a:t>DB (Oracle)</a:t>
+              <a:t>Database</a:t>
+            </a:r>
+          </a:p>
+          <a:p>
+            <a:pPr algn="ctr"/>
+            <a:r>
+              <a:rPr lang="en-US" sz="900" b="1" dirty="0" smtClean="0">
+                <a:solidFill>
+                  <a:schemeClr val="tx1"/>
+                </a:solidFill>
+              </a:rPr>
+              <a:t>(</a:t>
+            </a:r>
+            <a:r>
+              <a:rPr lang="en-US" sz="900" b="1" dirty="0" err="1" smtClean="0">
+                <a:solidFill>
+                  <a:schemeClr val="tx1"/>
+                </a:solidFill>
+              </a:rPr>
+              <a:t>Sql</a:t>
+            </a:r>
+            <a:r>
+              <a:rPr lang="en-US" sz="900" b="1" dirty="0" smtClean="0">
+                <a:solidFill>
+                  <a:schemeClr val="tx1"/>
+                </a:solidFill>
+              </a:rPr>
+              <a:t>, Oracle, </a:t>
+            </a:r>
+            <a:r>
+              <a:rPr lang="en-US" sz="900" b="1" dirty="0" err="1" smtClean="0">
+                <a:solidFill>
+                  <a:schemeClr val="tx1"/>
+                </a:solidFill>
+              </a:rPr>
+              <a:t>MySql</a:t>
+            </a:r>
+            <a:r>
+              <a:rPr lang="en-US" sz="900" b="1" dirty="0" smtClean="0">
+                <a:solidFill>
+                  <a:schemeClr val="tx1"/>
+                </a:solidFill>
+              </a:rPr>
+              <a:t>, </a:t>
+            </a:r>
+            <a:r>
+              <a:rPr lang="en-US" sz="900" b="1" dirty="0" err="1" smtClean="0">
+                <a:solidFill>
+                  <a:schemeClr val="tx1"/>
+                </a:solidFill>
+              </a:rPr>
+              <a:t>etc</a:t>
+            </a:r>
+            <a:r>
+              <a:rPr lang="en-US" sz="900" b="1" dirty="0" smtClean="0">
+                <a:solidFill>
+                  <a:schemeClr val="tx1"/>
+                </a:solidFill>
+              </a:rPr>
+              <a:t>)</a:t>
             </a:r>
             <a:endParaRPr lang="en-US" sz="900" b="1" dirty="0">
               <a:solidFill>
@@ -3039,274 +3140,27 @@
       </p:sp>
       <p:sp>
         <p:nvSpPr>
-          <p:cNvPr id="5" name="Flowchart: Magnetic Disk 4"/>
-          <p:cNvSpPr/>
-          <p:nvPr/>
-        </p:nvSpPr>
-        <p:spPr>
-          <a:xfrm>
-            <a:off x="4583513" y="5601220"/>
-            <a:ext cx="1237550" cy="597593"/>
-          </a:xfrm>
-          <a:prstGeom prst="flowChartMagneticDisk">
-            <a:avLst/>
-          </a:prstGeom>
-          <a:solidFill>
-            <a:schemeClr val="accent1">
-              <a:lumMod val="20000"/>
-              <a:lumOff val="80000"/>
-            </a:schemeClr>
-          </a:solidFill>
-          <a:ln w="9525">
-            <a:solidFill>
-              <a:schemeClr val="bg1">
-                <a:lumMod val="50000"/>
-              </a:schemeClr>
-            </a:solidFill>
-            <a:prstDash val="dash"/>
-          </a:ln>
-          <a:effectLst/>
-        </p:spPr>
-        <p:style>
-          <a:lnRef idx="1">
-            <a:schemeClr val="accent1"/>
-          </a:lnRef>
-          <a:fillRef idx="2">
-            <a:schemeClr val="accent1"/>
-          </a:fillRef>
-          <a:effectRef idx="1">
-            <a:schemeClr val="accent1"/>
-          </a:effectRef>
-          <a:fontRef idx="minor">
-            <a:schemeClr val="dk1"/>
-          </a:fontRef>
-        </p:style>
-        <p:txBody>
-          <a:bodyPr rtlCol="0" anchor="ctr"/>
-          <a:lstStyle/>
-          <a:p>
-            <a:pPr algn="ctr"/>
-            <a:r>
-              <a:rPr lang="en-US" sz="900" b="1" dirty="0" smtClean="0">
-                <a:solidFill>
-                  <a:schemeClr val="tx1"/>
-                </a:solidFill>
-              </a:rPr>
-              <a:t>DB (</a:t>
-            </a:r>
-            <a:r>
-              <a:rPr lang="en-US" sz="900" b="1" dirty="0" err="1" smtClean="0">
-                <a:solidFill>
-                  <a:schemeClr val="tx1"/>
-                </a:solidFill>
-              </a:rPr>
-              <a:t>SqlServer</a:t>
-            </a:r>
-            <a:r>
-              <a:rPr lang="en-US" sz="900" b="1" dirty="0" smtClean="0">
-                <a:solidFill>
-                  <a:schemeClr val="tx1"/>
-                </a:solidFill>
-              </a:rPr>
-              <a:t>)</a:t>
-            </a:r>
-            <a:endParaRPr lang="en-US" sz="900" b="1" dirty="0">
-              <a:solidFill>
-                <a:schemeClr val="tx1"/>
-              </a:solidFill>
-            </a:endParaRPr>
-          </a:p>
-        </p:txBody>
-      </p:sp>
-      <p:sp>
-        <p:nvSpPr>
-          <p:cNvPr id="6" name="Flowchart: Magnetic Disk 5"/>
-          <p:cNvSpPr/>
-          <p:nvPr/>
-        </p:nvSpPr>
-        <p:spPr>
-          <a:xfrm>
-            <a:off x="2814035" y="5601221"/>
-            <a:ext cx="1237550" cy="597593"/>
-          </a:xfrm>
-          <a:prstGeom prst="flowChartMagneticDisk">
-            <a:avLst/>
-          </a:prstGeom>
-          <a:solidFill>
-            <a:schemeClr val="accent1">
-              <a:lumMod val="20000"/>
-              <a:lumOff val="80000"/>
-            </a:schemeClr>
-          </a:solidFill>
-          <a:ln w="9525">
-            <a:solidFill>
-              <a:schemeClr val="bg1">
-                <a:lumMod val="50000"/>
-              </a:schemeClr>
-            </a:solidFill>
-            <a:prstDash val="dash"/>
-          </a:ln>
-          <a:effectLst/>
-        </p:spPr>
-        <p:style>
-          <a:lnRef idx="1">
-            <a:schemeClr val="accent1"/>
-          </a:lnRef>
-          <a:fillRef idx="2">
-            <a:schemeClr val="accent1"/>
-          </a:fillRef>
-          <a:effectRef idx="1">
-            <a:schemeClr val="accent1"/>
-          </a:effectRef>
-          <a:fontRef idx="minor">
-            <a:schemeClr val="dk1"/>
-          </a:fontRef>
-        </p:style>
-        <p:txBody>
-          <a:bodyPr rtlCol="0" anchor="ctr"/>
-          <a:lstStyle/>
-          <a:p>
-            <a:pPr algn="ctr"/>
-            <a:r>
-              <a:rPr lang="en-US" sz="900" b="1" dirty="0" smtClean="0">
-                <a:solidFill>
-                  <a:schemeClr val="tx1"/>
-                </a:solidFill>
-              </a:rPr>
-              <a:t>DB (</a:t>
-            </a:r>
-            <a:r>
-              <a:rPr lang="en-US" sz="900" b="1" dirty="0" err="1" smtClean="0">
-                <a:solidFill>
-                  <a:schemeClr val="tx1"/>
-                </a:solidFill>
-              </a:rPr>
-              <a:t>MySql</a:t>
-            </a:r>
-            <a:r>
-              <a:rPr lang="en-US" sz="900" b="1" dirty="0" smtClean="0">
-                <a:solidFill>
-                  <a:schemeClr val="tx1"/>
-                </a:solidFill>
-              </a:rPr>
-              <a:t>)</a:t>
-            </a:r>
-            <a:endParaRPr lang="en-US" sz="900" b="1" dirty="0">
-              <a:solidFill>
-                <a:schemeClr val="tx1"/>
-              </a:solidFill>
-            </a:endParaRPr>
-          </a:p>
-        </p:txBody>
-      </p:sp>
-      <p:sp>
-        <p:nvSpPr>
-          <p:cNvPr id="7" name="Flowchart: Magnetic Disk 6"/>
-          <p:cNvSpPr/>
-          <p:nvPr/>
-        </p:nvSpPr>
-        <p:spPr>
-          <a:xfrm>
-            <a:off x="8127723" y="5601221"/>
-            <a:ext cx="1251837" cy="597593"/>
-          </a:xfrm>
-          <a:prstGeom prst="flowChartMagneticDisk">
-            <a:avLst/>
-          </a:prstGeom>
-          <a:solidFill>
-            <a:schemeClr val="accent1">
-              <a:lumMod val="20000"/>
-              <a:lumOff val="80000"/>
-            </a:schemeClr>
-          </a:solidFill>
-          <a:ln w="9525">
-            <a:solidFill>
-              <a:schemeClr val="bg1">
-                <a:lumMod val="50000"/>
-              </a:schemeClr>
-            </a:solidFill>
-            <a:prstDash val="dash"/>
-          </a:ln>
-          <a:effectLst/>
-        </p:spPr>
-        <p:style>
-          <a:lnRef idx="1">
-            <a:schemeClr val="accent1"/>
-          </a:lnRef>
-          <a:fillRef idx="2">
-            <a:schemeClr val="accent1"/>
-          </a:fillRef>
-          <a:effectRef idx="1">
-            <a:schemeClr val="accent1"/>
-          </a:effectRef>
-          <a:fontRef idx="minor">
-            <a:schemeClr val="dk1"/>
-          </a:fontRef>
-        </p:style>
-        <p:txBody>
-          <a:bodyPr rtlCol="0" anchor="ctr"/>
-          <a:lstStyle/>
-          <a:p>
-            <a:pPr algn="ctr"/>
-            <a:r>
-              <a:rPr lang="en-US" sz="900" b="1" dirty="0" smtClean="0">
-                <a:solidFill>
-                  <a:schemeClr val="tx1"/>
-                </a:solidFill>
-              </a:rPr>
-              <a:t>DB (</a:t>
-            </a:r>
-            <a:r>
-              <a:rPr lang="en-US" sz="900" b="1" dirty="0" err="1" smtClean="0">
-                <a:solidFill>
-                  <a:schemeClr val="tx1"/>
-                </a:solidFill>
-              </a:rPr>
-              <a:t>PostgreSql</a:t>
-            </a:r>
-            <a:r>
-              <a:rPr lang="en-US" sz="900" b="1" dirty="0" smtClean="0">
-                <a:solidFill>
-                  <a:schemeClr val="tx1"/>
-                </a:solidFill>
-              </a:rPr>
-              <a:t>)</a:t>
-            </a:r>
-            <a:endParaRPr lang="en-US" sz="900" b="1" dirty="0">
-              <a:solidFill>
-                <a:schemeClr val="tx1"/>
-              </a:solidFill>
-            </a:endParaRPr>
-          </a:p>
-        </p:txBody>
-      </p:sp>
-      <p:sp>
-        <p:nvSpPr>
           <p:cNvPr id="8" name="Flowchart: Alternate Process 7"/>
           <p:cNvSpPr/>
           <p:nvPr/>
         </p:nvSpPr>
         <p:spPr>
           <a:xfrm>
-            <a:off x="5253835" y="3307126"/>
+            <a:off x="5263360" y="3221399"/>
             <a:ext cx="1685925" cy="484061"/>
           </a:xfrm>
           <a:prstGeom prst="flowChartAlternateProcess">
             <a:avLst/>
           </a:prstGeom>
-          <a:solidFill>
-            <a:schemeClr val="accent6">
-              <a:lumMod val="20000"/>
-              <a:lumOff val="80000"/>
-            </a:schemeClr>
-          </a:solidFill>
-          <a:ln>
+          <a:noFill/>
+          <a:ln w="12700">
             <a:solidFill>
-              <a:schemeClr val="bg1">
-                <a:lumMod val="50000"/>
+              <a:schemeClr val="tx1">
+                <a:lumMod val="95000"/>
+                <a:lumOff val="5000"/>
               </a:schemeClr>
             </a:solidFill>
-            <a:prstDash val="dash"/>
+            <a:prstDash val="solid"/>
           </a:ln>
           <a:effectLst/>
         </p:spPr>
@@ -3353,25 +3207,21 @@
         </p:nvSpPr>
         <p:spPr>
           <a:xfrm>
-            <a:off x="5249418" y="2475061"/>
+            <a:off x="5258943" y="2389334"/>
             <a:ext cx="1685925" cy="484061"/>
           </a:xfrm>
           <a:prstGeom prst="flowChartAlternateProcess">
             <a:avLst/>
           </a:prstGeom>
-          <a:solidFill>
-            <a:schemeClr val="tx2">
-              <a:lumMod val="20000"/>
-              <a:lumOff val="80000"/>
-            </a:schemeClr>
-          </a:solidFill>
-          <a:ln>
+          <a:noFill/>
+          <a:ln w="12700">
             <a:solidFill>
-              <a:schemeClr val="bg1">
-                <a:lumMod val="50000"/>
+              <a:schemeClr val="tx1">
+                <a:lumMod val="95000"/>
+                <a:lumOff val="5000"/>
               </a:schemeClr>
             </a:solidFill>
-            <a:prstDash val="dash"/>
+            <a:prstDash val="solid"/>
           </a:ln>
           <a:effectLst/>
         </p:spPr>
@@ -3450,25 +3300,21 @@
         </p:nvSpPr>
         <p:spPr>
           <a:xfrm>
-            <a:off x="5249735" y="1700894"/>
+            <a:off x="5259260" y="1615167"/>
             <a:ext cx="1685925" cy="484061"/>
           </a:xfrm>
           <a:prstGeom prst="flowChartAlternateProcess">
             <a:avLst/>
           </a:prstGeom>
-          <a:solidFill>
-            <a:schemeClr val="tx2">
-              <a:lumMod val="20000"/>
-              <a:lumOff val="80000"/>
-            </a:schemeClr>
-          </a:solidFill>
-          <a:ln>
+          <a:noFill/>
+          <a:ln w="12700">
             <a:solidFill>
-              <a:schemeClr val="bg1">
-                <a:lumMod val="50000"/>
+              <a:schemeClr val="tx1">
+                <a:lumMod val="95000"/>
+                <a:lumOff val="5000"/>
               </a:schemeClr>
             </a:solidFill>
-            <a:prstDash val="dash"/>
+            <a:prstDash val="solid"/>
           </a:ln>
           <a:effectLst/>
         </p:spPr>
@@ -3563,20 +3409,21 @@
         </p:nvSpPr>
         <p:spPr>
           <a:xfrm>
-            <a:off x="7693635" y="859811"/>
+            <a:off x="7703160" y="774084"/>
             <a:ext cx="1685925" cy="484061"/>
           </a:xfrm>
           <a:prstGeom prst="flowChartAlternateProcess">
             <a:avLst/>
           </a:prstGeom>
           <a:noFill/>
-          <a:ln>
+          <a:ln w="12700">
             <a:solidFill>
-              <a:schemeClr val="bg1">
-                <a:lumMod val="50000"/>
+              <a:schemeClr val="tx1">
+                <a:lumMod val="95000"/>
+                <a:lumOff val="5000"/>
               </a:schemeClr>
             </a:solidFill>
-            <a:prstDash val="dash"/>
+            <a:prstDash val="solid"/>
           </a:ln>
           <a:effectLst/>
         </p:spPr>
@@ -3687,17 +3534,18 @@
         </p:nvSpPr>
         <p:spPr>
           <a:xfrm>
-            <a:off x="7299048" y="3310859"/>
+            <a:off x="7308573" y="3225132"/>
             <a:ext cx="1685925" cy="484061"/>
           </a:xfrm>
           <a:prstGeom prst="flowChartAlternateProcess">
             <a:avLst/>
           </a:prstGeom>
           <a:noFill/>
-          <a:ln>
+          <a:ln w="12700">
             <a:solidFill>
-              <a:schemeClr val="bg1">
-                <a:lumMod val="50000"/>
+              <a:schemeClr val="tx1">
+                <a:lumMod val="95000"/>
+                <a:lumOff val="5000"/>
               </a:schemeClr>
             </a:solidFill>
             <a:prstDash val="dash"/>
@@ -3806,17 +3654,18 @@
         </p:nvSpPr>
         <p:spPr>
           <a:xfrm>
-            <a:off x="4135138" y="4157515"/>
+            <a:off x="4144663" y="4071788"/>
             <a:ext cx="1685925" cy="733424"/>
           </a:xfrm>
           <a:prstGeom prst="flowChartAlternateProcess">
             <a:avLst/>
           </a:prstGeom>
           <a:noFill/>
-          <a:ln>
+          <a:ln w="12700">
             <a:solidFill>
-              <a:schemeClr val="bg1">
-                <a:lumMod val="50000"/>
+              <a:schemeClr val="tx1">
+                <a:lumMod val="95000"/>
+                <a:lumOff val="5000"/>
               </a:schemeClr>
             </a:solidFill>
             <a:prstDash val="dash"/>
@@ -3933,17 +3782,18 @@
         </p:nvSpPr>
         <p:spPr>
           <a:xfrm>
-            <a:off x="1482492" y="3093388"/>
-            <a:ext cx="1366842" cy="904632"/>
+            <a:off x="1487602" y="3208398"/>
+            <a:ext cx="1366842" cy="484061"/>
           </a:xfrm>
           <a:prstGeom prst="flowChartAlternateProcess">
             <a:avLst/>
           </a:prstGeom>
           <a:noFill/>
-          <a:ln>
+          <a:ln w="12700">
             <a:solidFill>
-              <a:schemeClr val="bg1">
-                <a:lumMod val="50000"/>
+              <a:schemeClr val="tx1">
+                <a:lumMod val="95000"/>
+                <a:lumOff val="5000"/>
               </a:schemeClr>
             </a:solidFill>
             <a:prstDash val="dash"/>
@@ -3988,38 +3838,6 @@
               </a:rPr>
               <a:t>GetFields</a:t>
             </a:r>
-            <a:endParaRPr lang="en-US" sz="900" dirty="0" smtClean="0">
-              <a:solidFill>
-                <a:schemeClr val="tx1"/>
-              </a:solidFill>
-            </a:endParaRPr>
-          </a:p>
-          <a:p>
-            <a:pPr algn="ctr"/>
-            <a:r>
-              <a:rPr lang="en-US" sz="900" dirty="0" err="1" smtClean="0">
-                <a:solidFill>
-                  <a:schemeClr val="tx1"/>
-                </a:solidFill>
-              </a:rPr>
-              <a:t>GetSchema</a:t>
-            </a:r>
-            <a:endParaRPr lang="en-US" sz="900" dirty="0" smtClean="0">
-              <a:solidFill>
-                <a:schemeClr val="tx1"/>
-              </a:solidFill>
-            </a:endParaRPr>
-          </a:p>
-          <a:p>
-            <a:pPr algn="ctr"/>
-            <a:r>
-              <a:rPr lang="en-US" sz="900" dirty="0" err="1" smtClean="0">
-                <a:solidFill>
-                  <a:schemeClr val="tx1"/>
-                </a:solidFill>
-              </a:rPr>
-              <a:t>GetVersion</a:t>
-            </a:r>
             <a:endParaRPr lang="en-US" sz="900" dirty="0">
               <a:solidFill>
                 <a:schemeClr val="tx1"/>
@@ -4036,17 +3854,18 @@
         </p:nvSpPr>
         <p:spPr>
           <a:xfrm>
-            <a:off x="9344261" y="3101660"/>
-            <a:ext cx="1518049" cy="904632"/>
+            <a:off x="9353786" y="3221397"/>
+            <a:ext cx="1518049" cy="484061"/>
           </a:xfrm>
           <a:prstGeom prst="flowChartAlternateProcess">
             <a:avLst/>
           </a:prstGeom>
           <a:noFill/>
-          <a:ln>
+          <a:ln w="12700">
             <a:solidFill>
-              <a:schemeClr val="bg1">
-                <a:lumMod val="50000"/>
+              <a:schemeClr val="tx1">
+                <a:lumMod val="95000"/>
+                <a:lumOff val="5000"/>
               </a:schemeClr>
             </a:solidFill>
             <a:prstDash val="dash"/>
@@ -4091,54 +3910,6 @@
               </a:rPr>
               <a:t>BulkInsert</a:t>
             </a:r>
-            <a:endParaRPr lang="en-US" sz="900" dirty="0" smtClean="0">
-              <a:solidFill>
-                <a:schemeClr val="tx1"/>
-              </a:solidFill>
-            </a:endParaRPr>
-          </a:p>
-          <a:p>
-            <a:pPr algn="ctr"/>
-            <a:r>
-              <a:rPr lang="en-US" sz="900" dirty="0" err="1" smtClean="0">
-                <a:solidFill>
-                  <a:schemeClr val="tx1"/>
-                </a:solidFill>
-              </a:rPr>
-              <a:t>AllowIdentityInsert</a:t>
-            </a:r>
-            <a:endParaRPr lang="en-US" sz="900" dirty="0" smtClean="0">
-              <a:solidFill>
-                <a:schemeClr val="tx1"/>
-              </a:solidFill>
-            </a:endParaRPr>
-          </a:p>
-          <a:p>
-            <a:pPr algn="ctr"/>
-            <a:r>
-              <a:rPr lang="en-US" sz="900" dirty="0" err="1" smtClean="0">
-                <a:solidFill>
-                  <a:schemeClr val="tx1"/>
-                </a:solidFill>
-              </a:rPr>
-              <a:t>DisallowIdentityInsert</a:t>
-            </a:r>
-            <a:endParaRPr lang="en-US" sz="900" dirty="0" smtClean="0">
-              <a:solidFill>
-                <a:schemeClr val="tx1"/>
-              </a:solidFill>
-            </a:endParaRPr>
-          </a:p>
-          <a:p>
-            <a:pPr algn="ctr"/>
-            <a:r>
-              <a:rPr lang="en-US" sz="900" dirty="0" err="1" smtClean="0">
-                <a:solidFill>
-                  <a:schemeClr val="tx1"/>
-                </a:solidFill>
-              </a:rPr>
-              <a:t>EnableBroker</a:t>
-            </a:r>
             <a:endParaRPr lang="en-US" sz="900" dirty="0">
               <a:solidFill>
                 <a:schemeClr val="tx1"/>
@@ -4155,20 +3926,21 @@
         </p:nvSpPr>
         <p:spPr>
           <a:xfrm>
-            <a:off x="2814034" y="885196"/>
+            <a:off x="2823559" y="799469"/>
             <a:ext cx="1685925" cy="484061"/>
           </a:xfrm>
           <a:prstGeom prst="flowChartAlternateProcess">
             <a:avLst/>
           </a:prstGeom>
           <a:noFill/>
-          <a:ln>
+          <a:ln w="12700">
             <a:solidFill>
-              <a:schemeClr val="bg1">
-                <a:lumMod val="50000"/>
+              <a:schemeClr val="tx1">
+                <a:lumMod val="95000"/>
+                <a:lumOff val="5000"/>
               </a:schemeClr>
             </a:solidFill>
-            <a:prstDash val="dash"/>
+            <a:prstDash val="solid"/>
           </a:ln>
           <a:effectLst/>
         </p:spPr>
@@ -4197,7 +3969,7 @@
                   <a:schemeClr val="tx1"/>
                 </a:solidFill>
               </a:rPr>
-              <a:t>IStamentBuilder</a:t>
+              <a:t>IStatementBuilder</a:t>
             </a:r>
             <a:endParaRPr lang="en-US" sz="900" b="1" dirty="0" smtClean="0">
               <a:solidFill>
@@ -4279,20 +4051,21 @@
         </p:nvSpPr>
         <p:spPr>
           <a:xfrm>
-            <a:off x="5249419" y="890056"/>
+            <a:off x="5258944" y="804329"/>
             <a:ext cx="1685925" cy="484061"/>
           </a:xfrm>
           <a:prstGeom prst="flowChartAlternateProcess">
             <a:avLst/>
           </a:prstGeom>
           <a:noFill/>
-          <a:ln>
+          <a:ln w="12700">
             <a:solidFill>
-              <a:schemeClr val="bg1">
-                <a:lumMod val="50000"/>
+              <a:schemeClr val="tx1">
+                <a:lumMod val="95000"/>
+                <a:lumOff val="5000"/>
               </a:schemeClr>
             </a:solidFill>
-            <a:prstDash val="dash"/>
+            <a:prstDash val="solid"/>
           </a:ln>
           <a:effectLst/>
         </p:spPr>
@@ -4403,17 +4176,18 @@
         </p:nvSpPr>
         <p:spPr>
           <a:xfrm>
-            <a:off x="3208622" y="3307124"/>
+            <a:off x="3218147" y="3221397"/>
             <a:ext cx="1685925" cy="484061"/>
           </a:xfrm>
           <a:prstGeom prst="flowChartAlternateProcess">
             <a:avLst/>
           </a:prstGeom>
           <a:noFill/>
-          <a:ln>
+          <a:ln w="12700">
             <a:solidFill>
-              <a:schemeClr val="bg1">
-                <a:lumMod val="50000"/>
+              <a:schemeClr val="tx1">
+                <a:lumMod val="95000"/>
+                <a:lumOff val="5000"/>
               </a:schemeClr>
             </a:solidFill>
             <a:prstDash val="dash"/>
@@ -4527,17 +4301,18 @@
         </p:nvSpPr>
         <p:spPr>
           <a:xfrm>
-            <a:off x="6352992" y="4157515"/>
+            <a:off x="6362517" y="4071788"/>
             <a:ext cx="1685925" cy="733424"/>
           </a:xfrm>
           <a:prstGeom prst="flowChartAlternateProcess">
             <a:avLst/>
           </a:prstGeom>
           <a:noFill/>
-          <a:ln>
+          <a:ln w="12700">
             <a:solidFill>
-              <a:schemeClr val="bg1">
-                <a:lumMod val="50000"/>
+              <a:schemeClr val="tx1">
+                <a:lumMod val="95000"/>
+                <a:lumOff val="5000"/>
               </a:schemeClr>
             </a:solidFill>
             <a:prstDash val="dash"/>
@@ -4654,17 +4429,18 @@
         </p:nvSpPr>
         <p:spPr>
           <a:xfrm>
-            <a:off x="1482492" y="2009881"/>
+            <a:off x="1492017" y="1924154"/>
             <a:ext cx="1685925" cy="484061"/>
           </a:xfrm>
           <a:prstGeom prst="flowChartAlternateProcess">
             <a:avLst/>
           </a:prstGeom>
           <a:noFill/>
-          <a:ln>
+          <a:ln w="12700">
             <a:solidFill>
-              <a:schemeClr val="bg1">
-                <a:lumMod val="50000"/>
+              <a:schemeClr val="tx1">
+                <a:lumMod val="95000"/>
+                <a:lumOff val="5000"/>
               </a:schemeClr>
             </a:solidFill>
             <a:prstDash val="dash"/>
@@ -4765,7 +4541,7 @@
         </p:nvCxnSpPr>
         <p:spPr>
           <a:xfrm>
-            <a:off x="4499959" y="1127227"/>
+            <a:off x="4509484" y="1041500"/>
             <a:ext cx="749776" cy="815698"/>
           </a:xfrm>
           <a:prstGeom prst="bentConnector3">
@@ -4773,10 +4549,11 @@
               <a:gd name="adj1" fmla="val 50000"/>
             </a:avLst>
           </a:prstGeom>
-          <a:ln w="9525">
+          <a:ln w="12700">
             <a:solidFill>
-              <a:schemeClr val="bg1">
-                <a:lumMod val="50000"/>
+              <a:schemeClr val="tx1">
+                <a:lumMod val="95000"/>
+                <a:lumOff val="5000"/>
               </a:schemeClr>
             </a:solidFill>
             <a:prstDash val="dash"/>
@@ -4809,7 +4586,7 @@
         </p:nvCxnSpPr>
         <p:spPr>
           <a:xfrm rot="16200000" flipH="1">
-            <a:off x="5929152" y="1537347"/>
+            <a:off x="5938677" y="1451620"/>
             <a:ext cx="326777" cy="316"/>
           </a:xfrm>
           <a:prstGeom prst="bentConnector3">
@@ -4817,10 +4594,11 @@
               <a:gd name="adj1" fmla="val 50000"/>
             </a:avLst>
           </a:prstGeom>
-          <a:ln w="9525">
+          <a:ln w="12700">
             <a:solidFill>
-              <a:schemeClr val="bg1">
-                <a:lumMod val="50000"/>
+              <a:schemeClr val="tx1">
+                <a:lumMod val="95000"/>
+                <a:lumOff val="5000"/>
               </a:schemeClr>
             </a:solidFill>
             <a:prstDash val="dash"/>
@@ -4853,7 +4631,7 @@
         </p:nvCxnSpPr>
         <p:spPr>
           <a:xfrm rot="10800000" flipV="1">
-            <a:off x="6935661" y="1101841"/>
+            <a:off x="6945186" y="1016114"/>
             <a:ext cx="757975" cy="841083"/>
           </a:xfrm>
           <a:prstGeom prst="bentConnector3">
@@ -4861,10 +4639,11 @@
               <a:gd name="adj1" fmla="val 50000"/>
             </a:avLst>
           </a:prstGeom>
-          <a:ln w="9525">
+          <a:ln w="12700">
             <a:solidFill>
-              <a:schemeClr val="bg1">
-                <a:lumMod val="50000"/>
+              <a:schemeClr val="tx1">
+                <a:lumMod val="95000"/>
+                <a:lumOff val="5000"/>
               </a:schemeClr>
             </a:solidFill>
             <a:prstDash val="dash"/>
@@ -4897,16 +4676,17 @@
         </p:nvCxnSpPr>
         <p:spPr>
           <a:xfrm flipV="1">
-            <a:off x="6935343" y="1343872"/>
+            <a:off x="6944868" y="1258145"/>
             <a:ext cx="1601255" cy="1373220"/>
           </a:xfrm>
           <a:prstGeom prst="bentConnector2">
             <a:avLst/>
           </a:prstGeom>
-          <a:ln w="9525">
+          <a:ln w="12700">
             <a:solidFill>
-              <a:schemeClr val="bg1">
-                <a:lumMod val="50000"/>
+              <a:schemeClr val="tx1">
+                <a:lumMod val="95000"/>
+                <a:lumOff val="5000"/>
               </a:schemeClr>
             </a:solidFill>
             <a:prstDash val="dash"/>
@@ -4939,16 +4719,17 @@
         </p:nvCxnSpPr>
         <p:spPr>
           <a:xfrm rot="16200000" flipH="1">
-            <a:off x="3779290" y="1246963"/>
+            <a:off x="3788815" y="1161236"/>
             <a:ext cx="1347835" cy="1592421"/>
           </a:xfrm>
           <a:prstGeom prst="bentConnector2">
             <a:avLst/>
           </a:prstGeom>
-          <a:ln w="9525">
+          <a:ln w="12700">
             <a:solidFill>
-              <a:schemeClr val="bg1">
-                <a:lumMod val="50000"/>
+              <a:schemeClr val="tx1">
+                <a:lumMod val="95000"/>
+                <a:lumOff val="5000"/>
               </a:schemeClr>
             </a:solidFill>
             <a:prstDash val="dash"/>
@@ -4981,7 +4762,7 @@
         </p:nvCxnSpPr>
         <p:spPr>
           <a:xfrm rot="5400000" flipH="1" flipV="1">
-            <a:off x="5947486" y="2329850"/>
+            <a:off x="5957011" y="2244123"/>
             <a:ext cx="290106" cy="317"/>
           </a:xfrm>
           <a:prstGeom prst="bentConnector3">
@@ -4989,10 +4770,11 @@
               <a:gd name="adj1" fmla="val 50000"/>
             </a:avLst>
           </a:prstGeom>
-          <a:ln w="9525">
+          <a:ln w="12700">
             <a:solidFill>
-              <a:schemeClr val="bg1">
-                <a:lumMod val="50000"/>
+              <a:schemeClr val="tx1">
+                <a:lumMod val="95000"/>
+                <a:lumOff val="5000"/>
               </a:schemeClr>
             </a:solidFill>
             <a:prstDash val="dash"/>
@@ -5025,7 +4807,7 @@
         </p:nvCxnSpPr>
         <p:spPr>
           <a:xfrm rot="16200000" flipV="1">
-            <a:off x="5920588" y="3130915"/>
+            <a:off x="5930113" y="3045188"/>
             <a:ext cx="348004" cy="4417"/>
           </a:xfrm>
           <a:prstGeom prst="bentConnector3">
@@ -5033,10 +4815,11 @@
               <a:gd name="adj1" fmla="val 50000"/>
             </a:avLst>
           </a:prstGeom>
-          <a:ln w="9525">
+          <a:ln w="12700">
             <a:solidFill>
-              <a:schemeClr val="bg1">
-                <a:lumMod val="50000"/>
+              <a:schemeClr val="tx1">
+                <a:lumMod val="95000"/>
+                <a:lumOff val="5000"/>
               </a:schemeClr>
             </a:solidFill>
             <a:prstDash val="dash"/>
@@ -5069,7 +4852,7 @@
         </p:nvCxnSpPr>
         <p:spPr>
           <a:xfrm rot="16200000" flipH="1">
-            <a:off x="2781929" y="2037468"/>
+            <a:off x="2791454" y="1951741"/>
             <a:ext cx="813182" cy="1726130"/>
           </a:xfrm>
           <a:prstGeom prst="bentConnector3">
@@ -5077,10 +4860,11 @@
               <a:gd name="adj1" fmla="val 50000"/>
             </a:avLst>
           </a:prstGeom>
-          <a:ln w="9525">
+          <a:ln w="12700">
             <a:solidFill>
-              <a:schemeClr val="bg1">
-                <a:lumMod val="50000"/>
+              <a:schemeClr val="tx1">
+                <a:lumMod val="95000"/>
+                <a:lumOff val="5000"/>
               </a:schemeClr>
             </a:solidFill>
             <a:prstDash val="dash"/>
@@ -5113,18 +4897,19 @@
         </p:nvCxnSpPr>
         <p:spPr>
           <a:xfrm>
-            <a:off x="2849334" y="3545704"/>
-            <a:ext cx="359288" cy="3451"/>
+            <a:off x="2854444" y="3450429"/>
+            <a:ext cx="363703" cy="12999"/>
           </a:xfrm>
           <a:prstGeom prst="bentConnector3">
             <a:avLst>
               <a:gd name="adj1" fmla="val 50000"/>
             </a:avLst>
           </a:prstGeom>
-          <a:ln w="9525">
+          <a:ln w="12700">
             <a:solidFill>
-              <a:schemeClr val="bg1">
-                <a:lumMod val="50000"/>
+              <a:schemeClr val="tx1">
+                <a:lumMod val="95000"/>
+                <a:lumOff val="5000"/>
               </a:schemeClr>
             </a:solidFill>
             <a:prstDash val="dash"/>
@@ -5156,19 +4941,20 @@
           <p:nvPr/>
         </p:nvCxnSpPr>
         <p:spPr>
-          <a:xfrm>
-            <a:off x="8984973" y="3552890"/>
-            <a:ext cx="359288" cy="1086"/>
+          <a:xfrm flipV="1">
+            <a:off x="8994498" y="3463428"/>
+            <a:ext cx="359288" cy="3735"/>
           </a:xfrm>
           <a:prstGeom prst="bentConnector3">
             <a:avLst>
               <a:gd name="adj1" fmla="val 50000"/>
             </a:avLst>
           </a:prstGeom>
-          <a:ln w="9525">
+          <a:ln w="12700">
             <a:solidFill>
-              <a:schemeClr val="bg1">
-                <a:lumMod val="50000"/>
+              <a:schemeClr val="tx1">
+                <a:lumMod val="95000"/>
+                <a:lumOff val="5000"/>
               </a:schemeClr>
             </a:solidFill>
             <a:prstDash val="dash"/>
@@ -5201,7 +4987,7 @@
         </p:nvCxnSpPr>
         <p:spPr>
           <a:xfrm rot="10800000">
-            <a:off x="4894547" y="3549155"/>
+            <a:off x="4904072" y="3463428"/>
             <a:ext cx="359288" cy="2"/>
           </a:xfrm>
           <a:prstGeom prst="bentConnector3">
@@ -5209,10 +4995,11 @@
               <a:gd name="adj1" fmla="val 50000"/>
             </a:avLst>
           </a:prstGeom>
-          <a:ln w="9525">
+          <a:ln w="12700">
             <a:solidFill>
-              <a:schemeClr val="bg1">
-                <a:lumMod val="50000"/>
+              <a:schemeClr val="tx1">
+                <a:lumMod val="95000"/>
+                <a:lumOff val="5000"/>
               </a:schemeClr>
             </a:solidFill>
             <a:prstDash val="dash"/>
@@ -5245,16 +5032,17 @@
         </p:nvCxnSpPr>
         <p:spPr>
           <a:xfrm rot="5400000">
-            <a:off x="7725811" y="4108026"/>
+            <a:off x="7735336" y="4022299"/>
             <a:ext cx="729307" cy="103094"/>
           </a:xfrm>
           <a:prstGeom prst="bentConnector2">
             <a:avLst/>
           </a:prstGeom>
-          <a:ln w="9525">
+          <a:ln w="12700">
             <a:solidFill>
-              <a:schemeClr val="bg1">
-                <a:lumMod val="50000"/>
+              <a:schemeClr val="tx1">
+                <a:lumMod val="95000"/>
+                <a:lumOff val="5000"/>
               </a:schemeClr>
             </a:solidFill>
             <a:prstDash val="dash"/>
@@ -5287,7 +5075,7 @@
         </p:nvCxnSpPr>
         <p:spPr>
           <a:xfrm rot="16200000" flipV="1">
-            <a:off x="6463213" y="3424772"/>
+            <a:off x="6472738" y="3339045"/>
             <a:ext cx="366328" cy="1099157"/>
           </a:xfrm>
           <a:prstGeom prst="bentConnector3">
@@ -5295,10 +5083,11 @@
               <a:gd name="adj1" fmla="val 50000"/>
             </a:avLst>
           </a:prstGeom>
-          <a:ln w="9525">
+          <a:ln w="12700">
             <a:solidFill>
-              <a:schemeClr val="bg1">
-                <a:lumMod val="50000"/>
+              <a:schemeClr val="tx1">
+                <a:lumMod val="95000"/>
+                <a:lumOff val="5000"/>
               </a:schemeClr>
             </a:solidFill>
             <a:prstDash val="dash"/>
@@ -5331,7 +5120,7 @@
         </p:nvCxnSpPr>
         <p:spPr>
           <a:xfrm rot="5400000" flipH="1" flipV="1">
-            <a:off x="5354285" y="3415003"/>
+            <a:off x="5363810" y="3329276"/>
             <a:ext cx="366328" cy="1118697"/>
           </a:xfrm>
           <a:prstGeom prst="bentConnector3">
@@ -5339,98 +5128,11 @@
               <a:gd name="adj1" fmla="val 50000"/>
             </a:avLst>
           </a:prstGeom>
-          <a:ln w="9525">
+          <a:ln w="12700">
             <a:solidFill>
-              <a:schemeClr val="bg1">
-                <a:lumMod val="50000"/>
-              </a:schemeClr>
-            </a:solidFill>
-            <a:prstDash val="dash"/>
-          </a:ln>
-          <a:effectLst/>
-        </p:spPr>
-        <p:style>
-          <a:lnRef idx="1">
-            <a:schemeClr val="accent1"/>
-          </a:lnRef>
-          <a:fillRef idx="0">
-            <a:schemeClr val="accent1"/>
-          </a:fillRef>
-          <a:effectRef idx="0">
-            <a:schemeClr val="accent1"/>
-          </a:effectRef>
-          <a:fontRef idx="minor">
-            <a:schemeClr val="tx1"/>
-          </a:fontRef>
-        </p:style>
-      </p:cxnSp>
-      <p:cxnSp>
-        <p:nvCxnSpPr>
-          <p:cNvPr id="96" name="Elbow Connector 95"/>
-          <p:cNvCxnSpPr>
-            <a:stCxn id="7" idx="1"/>
-            <a:endCxn id="6" idx="1"/>
-          </p:cNvCxnSpPr>
-          <p:nvPr/>
-        </p:nvCxnSpPr>
-        <p:spPr>
-          <a:xfrm rot="16200000" flipV="1">
-            <a:off x="6093226" y="2940805"/>
-            <a:ext cx="12700" cy="5320832"/>
-          </a:xfrm>
-          <a:prstGeom prst="bentConnector3">
-            <a:avLst>
-              <a:gd name="adj1" fmla="val 2832504"/>
-            </a:avLst>
-          </a:prstGeom>
-          <a:ln w="9525">
-            <a:solidFill>
-              <a:schemeClr val="bg1">
-                <a:lumMod val="50000"/>
-              </a:schemeClr>
-            </a:solidFill>
-            <a:prstDash val="dash"/>
-          </a:ln>
-          <a:effectLst/>
-        </p:spPr>
-        <p:style>
-          <a:lnRef idx="1">
-            <a:schemeClr val="accent1"/>
-          </a:lnRef>
-          <a:fillRef idx="0">
-            <a:schemeClr val="accent1"/>
-          </a:fillRef>
-          <a:effectRef idx="0">
-            <a:schemeClr val="accent1"/>
-          </a:effectRef>
-          <a:fontRef idx="minor">
-            <a:schemeClr val="tx1"/>
-          </a:fontRef>
-        </p:style>
-      </p:cxnSp>
-      <p:cxnSp>
-        <p:nvCxnSpPr>
-          <p:cNvPr id="112" name="Elbow Connector 111"/>
-          <p:cNvCxnSpPr>
-            <a:stCxn id="13" idx="2"/>
-            <a:endCxn id="5" idx="1"/>
-          </p:cNvCxnSpPr>
-          <p:nvPr/>
-        </p:nvCxnSpPr>
-        <p:spPr>
-          <a:xfrm rot="16200000" flipH="1">
-            <a:off x="4735054" y="5133985"/>
-            <a:ext cx="710281" cy="224187"/>
-          </a:xfrm>
-          <a:prstGeom prst="bentConnector3">
-            <a:avLst>
-              <a:gd name="adj1" fmla="val 50000"/>
-            </a:avLst>
-          </a:prstGeom>
-          <a:ln w="9525">
-            <a:solidFill>
-              <a:schemeClr val="bg1">
-                <a:lumMod val="50000"/>
+              <a:schemeClr val="tx1">
+                <a:lumMod val="95000"/>
+                <a:lumOff val="5000"/>
               </a:schemeClr>
             </a:solidFill>
             <a:prstDash val="dash"/>
@@ -5456,25 +5158,24 @@
         <p:nvCxnSpPr>
           <p:cNvPr id="115" name="Elbow Connector 114"/>
           <p:cNvCxnSpPr>
-            <a:stCxn id="4" idx="1"/>
+            <a:stCxn id="4" idx="4"/>
             <a:endCxn id="27" idx="2"/>
           </p:cNvCxnSpPr>
           <p:nvPr/>
         </p:nvCxnSpPr>
         <p:spPr>
-          <a:xfrm rot="5400000" flipH="1" flipV="1">
-            <a:off x="6728720" y="5133987"/>
-            <a:ext cx="710283" cy="224188"/>
+          <a:xfrm flipV="1">
+            <a:off x="6767162" y="4805212"/>
+            <a:ext cx="438318" cy="915878"/>
           </a:xfrm>
-          <a:prstGeom prst="bentConnector3">
-            <a:avLst>
-              <a:gd name="adj1" fmla="val 50000"/>
-            </a:avLst>
+          <a:prstGeom prst="bentConnector2">
+            <a:avLst/>
           </a:prstGeom>
-          <a:ln w="9525">
+          <a:ln w="12700">
             <a:solidFill>
-              <a:schemeClr val="bg1">
-                <a:lumMod val="50000"/>
+              <a:schemeClr val="tx1">
+                <a:lumMod val="95000"/>
+                <a:lumOff val="5000"/>
               </a:schemeClr>
             </a:solidFill>
             <a:prstDash val="dash"/>
@@ -5496,6 +5197,104 @@
           </a:fontRef>
         </p:style>
       </p:cxnSp>
+      <p:cxnSp>
+        <p:nvCxnSpPr>
+          <p:cNvPr id="41" name="Elbow Connector 40"/>
+          <p:cNvCxnSpPr>
+            <a:stCxn id="4" idx="2"/>
+            <a:endCxn id="13" idx="2"/>
+          </p:cNvCxnSpPr>
+          <p:nvPr/>
+        </p:nvCxnSpPr>
+        <p:spPr>
+          <a:xfrm rot="10800000">
+            <a:off x="4987626" y="4805212"/>
+            <a:ext cx="541986" cy="915878"/>
+          </a:xfrm>
+          <a:prstGeom prst="bentConnector2">
+            <a:avLst/>
+          </a:prstGeom>
+          <a:ln w="12700">
+            <a:solidFill>
+              <a:schemeClr val="tx1">
+                <a:lumMod val="95000"/>
+                <a:lumOff val="5000"/>
+              </a:schemeClr>
+            </a:solidFill>
+            <a:prstDash val="dash"/>
+          </a:ln>
+          <a:effectLst/>
+        </p:spPr>
+        <p:style>
+          <a:lnRef idx="1">
+            <a:schemeClr val="accent1"/>
+          </a:lnRef>
+          <a:fillRef idx="0">
+            <a:schemeClr val="accent1"/>
+          </a:fillRef>
+          <a:effectRef idx="0">
+            <a:schemeClr val="accent1"/>
+          </a:effectRef>
+          <a:fontRef idx="minor">
+            <a:schemeClr val="tx1"/>
+          </a:fontRef>
+        </p:style>
+      </p:cxnSp>
+      <p:sp>
+        <p:nvSpPr>
+          <p:cNvPr id="23" name="Rectangle 22"/>
+          <p:cNvSpPr/>
+          <p:nvPr/>
+        </p:nvSpPr>
+        <p:spPr>
+          <a:xfrm>
+            <a:off x="1492016" y="5814670"/>
+            <a:ext cx="2569094" cy="343128"/>
+          </a:xfrm>
+          <a:prstGeom prst="rect">
+            <a:avLst/>
+          </a:prstGeom>
+          <a:noFill/>
+          <a:ln>
+            <a:noFill/>
+          </a:ln>
+        </p:spPr>
+        <p:style>
+          <a:lnRef idx="2">
+            <a:schemeClr val="accent1">
+              <a:shade val="50000"/>
+            </a:schemeClr>
+          </a:lnRef>
+          <a:fillRef idx="1">
+            <a:schemeClr val="accent1"/>
+          </a:fillRef>
+          <a:effectRef idx="0">
+            <a:schemeClr val="accent1"/>
+          </a:effectRef>
+          <a:fontRef idx="minor">
+            <a:schemeClr val="lt1"/>
+          </a:fontRef>
+        </p:style>
+        <p:txBody>
+          <a:bodyPr rtlCol="0" anchor="ctr"/>
+          <a:lstStyle/>
+          <a:p>
+            <a:r>
+              <a:rPr lang="en-US" sz="1400" dirty="0" smtClean="0">
+                <a:solidFill>
+                  <a:schemeClr val="tx1"/>
+                </a:solidFill>
+              </a:rPr>
+              <a:t>RepoDb High-Level Architecture</a:t>
+            </a:r>
+            <a:endParaRPr lang="en-US" sz="1400" dirty="0">
+              <a:solidFill>
+                <a:schemeClr val="tx1"/>
+              </a:solidFill>
+            </a:endParaRPr>
+          </a:p>
+        </p:txBody>
+      </p:sp>
     </p:spTree>
     <p:extLst>
       <p:ext uri="{BB962C8B-B14F-4D97-AF65-F5344CB8AC3E}">

</xml_diff>

<commit_message>
Minor updates to RepoDb HLA
</commit_message>
<xml_diff>
--- a/RepoDb.Wiki/Files/HLA.pptx
+++ b/RepoDb.Wiki/Files/HLA.pptx
@@ -2991,7 +2991,12 @@
           <a:prstGeom prst="rect">
             <a:avLst/>
           </a:prstGeom>
-          <a:ln>
+          <a:ln w="6350">
+            <a:solidFill>
+              <a:schemeClr val="bg1">
+                <a:lumMod val="50000"/>
+              </a:schemeClr>
+            </a:solidFill>
             <a:prstDash val="dash"/>
           </a:ln>
         </p:spPr>
@@ -3032,17 +3037,24 @@
           <a:prstGeom prst="flowChartMagneticDisk">
             <a:avLst/>
           </a:prstGeom>
-          <a:noFill/>
-          <a:ln w="12700">
+          <a:solidFill>
+            <a:schemeClr val="bg1"/>
+          </a:solidFill>
+          <a:ln w="6350">
             <a:solidFill>
-              <a:schemeClr val="tx1">
-                <a:lumMod val="95000"/>
-                <a:lumOff val="5000"/>
+              <a:schemeClr val="bg1">
+                <a:lumMod val="50000"/>
               </a:schemeClr>
             </a:solidFill>
             <a:prstDash val="solid"/>
           </a:ln>
-          <a:effectLst/>
+          <a:effectLst>
+            <a:outerShdw blurRad="50800" dist="38100" dir="5400000" algn="t" rotWithShape="0">
+              <a:prstClr val="black">
+                <a:alpha val="40000"/>
+              </a:prstClr>
+            </a:outerShdw>
+          </a:effectLst>
         </p:spPr>
         <p:style>
           <a:lnRef idx="1">
@@ -3152,17 +3164,24 @@
           <a:prstGeom prst="flowChartAlternateProcess">
             <a:avLst/>
           </a:prstGeom>
-          <a:noFill/>
-          <a:ln w="12700">
+          <a:solidFill>
+            <a:schemeClr val="lt1"/>
+          </a:solidFill>
+          <a:ln w="6350">
             <a:solidFill>
-              <a:schemeClr val="tx1">
-                <a:lumMod val="95000"/>
-                <a:lumOff val="5000"/>
+              <a:schemeClr val="bg1">
+                <a:lumMod val="50000"/>
               </a:schemeClr>
             </a:solidFill>
             <a:prstDash val="solid"/>
           </a:ln>
-          <a:effectLst/>
+          <a:effectLst>
+            <a:outerShdw blurRad="50800" dist="38100" dir="5400000" algn="t" rotWithShape="0">
+              <a:prstClr val="black">
+                <a:alpha val="40000"/>
+              </a:prstClr>
+            </a:outerShdw>
+          </a:effectLst>
         </p:spPr>
         <p:style>
           <a:lnRef idx="0">
@@ -3213,17 +3232,24 @@
           <a:prstGeom prst="flowChartAlternateProcess">
             <a:avLst/>
           </a:prstGeom>
-          <a:noFill/>
-          <a:ln w="12700">
+          <a:solidFill>
+            <a:schemeClr val="lt1"/>
+          </a:solidFill>
+          <a:ln w="6350">
             <a:solidFill>
-              <a:schemeClr val="tx1">
-                <a:lumMod val="95000"/>
-                <a:lumOff val="5000"/>
+              <a:schemeClr val="bg1">
+                <a:lumMod val="50000"/>
               </a:schemeClr>
             </a:solidFill>
             <a:prstDash val="solid"/>
           </a:ln>
-          <a:effectLst/>
+          <a:effectLst>
+            <a:outerShdw blurRad="50800" dist="38100" dir="5400000" algn="t" rotWithShape="0">
+              <a:prstClr val="black">
+                <a:alpha val="40000"/>
+              </a:prstClr>
+            </a:outerShdw>
+          </a:effectLst>
         </p:spPr>
         <p:style>
           <a:lnRef idx="0">
@@ -3306,17 +3332,24 @@
           <a:prstGeom prst="flowChartAlternateProcess">
             <a:avLst/>
           </a:prstGeom>
-          <a:noFill/>
-          <a:ln w="12700">
+          <a:solidFill>
+            <a:schemeClr val="lt1"/>
+          </a:solidFill>
+          <a:ln w="6350">
             <a:solidFill>
-              <a:schemeClr val="tx1">
-                <a:lumMod val="95000"/>
-                <a:lumOff val="5000"/>
+              <a:schemeClr val="bg1">
+                <a:lumMod val="50000"/>
               </a:schemeClr>
             </a:solidFill>
             <a:prstDash val="solid"/>
           </a:ln>
-          <a:effectLst/>
+          <a:effectLst>
+            <a:outerShdw blurRad="50800" dist="38100" dir="5400000" algn="t" rotWithShape="0">
+              <a:prstClr val="black">
+                <a:alpha val="40000"/>
+              </a:prstClr>
+            </a:outerShdw>
+          </a:effectLst>
         </p:spPr>
         <p:style>
           <a:lnRef idx="0">
@@ -3415,17 +3448,24 @@
           <a:prstGeom prst="flowChartAlternateProcess">
             <a:avLst/>
           </a:prstGeom>
-          <a:noFill/>
-          <a:ln w="12700">
+          <a:solidFill>
+            <a:schemeClr val="bg1"/>
+          </a:solidFill>
+          <a:ln w="6350">
             <a:solidFill>
-              <a:schemeClr val="tx1">
-                <a:lumMod val="95000"/>
-                <a:lumOff val="5000"/>
+              <a:schemeClr val="bg1">
+                <a:lumMod val="50000"/>
               </a:schemeClr>
             </a:solidFill>
             <a:prstDash val="solid"/>
           </a:ln>
-          <a:effectLst/>
+          <a:effectLst>
+            <a:outerShdw blurRad="50800" dist="38100" dir="5400000" algn="t" rotWithShape="0">
+              <a:prstClr val="black">
+                <a:alpha val="40000"/>
+              </a:prstClr>
+            </a:outerShdw>
+          </a:effectLst>
         </p:spPr>
         <p:style>
           <a:lnRef idx="0">
@@ -3540,17 +3580,24 @@
           <a:prstGeom prst="flowChartAlternateProcess">
             <a:avLst/>
           </a:prstGeom>
-          <a:noFill/>
-          <a:ln w="12700">
+          <a:solidFill>
+            <a:schemeClr val="bg1"/>
+          </a:solidFill>
+          <a:ln w="6350">
             <a:solidFill>
-              <a:schemeClr val="tx1">
-                <a:lumMod val="95000"/>
-                <a:lumOff val="5000"/>
+              <a:schemeClr val="bg1">
+                <a:lumMod val="50000"/>
               </a:schemeClr>
             </a:solidFill>
-            <a:prstDash val="dash"/>
+            <a:prstDash val="solid"/>
           </a:ln>
-          <a:effectLst/>
+          <a:effectLst>
+            <a:outerShdw blurRad="50800" dist="38100" dir="5400000" algn="t" rotWithShape="0">
+              <a:prstClr val="black">
+                <a:alpha val="40000"/>
+              </a:prstClr>
+            </a:outerShdw>
+          </a:effectLst>
         </p:spPr>
         <p:style>
           <a:lnRef idx="0">
@@ -3661,11 +3708,10 @@
             <a:avLst/>
           </a:prstGeom>
           <a:noFill/>
-          <a:ln w="12700">
+          <a:ln w="6350">
             <a:solidFill>
-              <a:schemeClr val="tx1">
-                <a:lumMod val="95000"/>
-                <a:lumOff val="5000"/>
+              <a:schemeClr val="bg1">
+                <a:lumMod val="50000"/>
               </a:schemeClr>
             </a:solidFill>
             <a:prstDash val="dash"/>
@@ -3789,11 +3835,10 @@
             <a:avLst/>
           </a:prstGeom>
           <a:noFill/>
-          <a:ln w="12700">
+          <a:ln w="6350">
             <a:solidFill>
-              <a:schemeClr val="tx1">
-                <a:lumMod val="95000"/>
-                <a:lumOff val="5000"/>
+              <a:schemeClr val="bg1">
+                <a:lumMod val="50000"/>
               </a:schemeClr>
             </a:solidFill>
             <a:prstDash val="dash"/>
@@ -3861,11 +3906,10 @@
             <a:avLst/>
           </a:prstGeom>
           <a:noFill/>
-          <a:ln w="12700">
+          <a:ln w="6350">
             <a:solidFill>
-              <a:schemeClr val="tx1">
-                <a:lumMod val="95000"/>
-                <a:lumOff val="5000"/>
+              <a:schemeClr val="bg1">
+                <a:lumMod val="50000"/>
               </a:schemeClr>
             </a:solidFill>
             <a:prstDash val="dash"/>
@@ -3932,17 +3976,24 @@
           <a:prstGeom prst="flowChartAlternateProcess">
             <a:avLst/>
           </a:prstGeom>
-          <a:noFill/>
-          <a:ln w="12700">
+          <a:solidFill>
+            <a:schemeClr val="bg1"/>
+          </a:solidFill>
+          <a:ln w="6350">
             <a:solidFill>
-              <a:schemeClr val="tx1">
-                <a:lumMod val="95000"/>
-                <a:lumOff val="5000"/>
+              <a:schemeClr val="bg1">
+                <a:lumMod val="50000"/>
               </a:schemeClr>
             </a:solidFill>
             <a:prstDash val="solid"/>
           </a:ln>
-          <a:effectLst/>
+          <a:effectLst>
+            <a:outerShdw blurRad="50800" dist="38100" dir="5400000" algn="t" rotWithShape="0">
+              <a:prstClr val="black">
+                <a:alpha val="40000"/>
+              </a:prstClr>
+            </a:outerShdw>
+          </a:effectLst>
         </p:spPr>
         <p:style>
           <a:lnRef idx="0">
@@ -4057,17 +4108,24 @@
           <a:prstGeom prst="flowChartAlternateProcess">
             <a:avLst/>
           </a:prstGeom>
-          <a:noFill/>
-          <a:ln w="12700">
+          <a:solidFill>
+            <a:schemeClr val="lt1"/>
+          </a:solidFill>
+          <a:ln w="6350">
             <a:solidFill>
-              <a:schemeClr val="tx1">
-                <a:lumMod val="95000"/>
-                <a:lumOff val="5000"/>
+              <a:schemeClr val="bg1">
+                <a:lumMod val="50000"/>
               </a:schemeClr>
             </a:solidFill>
             <a:prstDash val="solid"/>
           </a:ln>
-          <a:effectLst/>
+          <a:effectLst>
+            <a:outerShdw blurRad="50800" dist="38100" dir="5400000" algn="t" rotWithShape="0">
+              <a:prstClr val="black">
+                <a:alpha val="40000"/>
+              </a:prstClr>
+            </a:outerShdw>
+          </a:effectLst>
         </p:spPr>
         <p:style>
           <a:lnRef idx="0">
@@ -4182,17 +4240,24 @@
           <a:prstGeom prst="flowChartAlternateProcess">
             <a:avLst/>
           </a:prstGeom>
-          <a:noFill/>
-          <a:ln w="12700">
+          <a:solidFill>
+            <a:schemeClr val="bg1"/>
+          </a:solidFill>
+          <a:ln w="6350">
             <a:solidFill>
-              <a:schemeClr val="tx1">
-                <a:lumMod val="95000"/>
-                <a:lumOff val="5000"/>
+              <a:schemeClr val="bg1">
+                <a:lumMod val="50000"/>
               </a:schemeClr>
             </a:solidFill>
-            <a:prstDash val="dash"/>
+            <a:prstDash val="solid"/>
           </a:ln>
-          <a:effectLst/>
+          <a:effectLst>
+            <a:outerShdw blurRad="50800" dist="38100" dir="5400000" algn="t" rotWithShape="0">
+              <a:prstClr val="black">
+                <a:alpha val="40000"/>
+              </a:prstClr>
+            </a:outerShdw>
+          </a:effectLst>
         </p:spPr>
         <p:style>
           <a:lnRef idx="0">
@@ -4308,11 +4373,10 @@
             <a:avLst/>
           </a:prstGeom>
           <a:noFill/>
-          <a:ln w="12700">
+          <a:ln w="6350">
             <a:solidFill>
-              <a:schemeClr val="tx1">
-                <a:lumMod val="95000"/>
-                <a:lumOff val="5000"/>
+              <a:schemeClr val="bg1">
+                <a:lumMod val="50000"/>
               </a:schemeClr>
             </a:solidFill>
             <a:prstDash val="dash"/>
@@ -4436,11 +4500,10 @@
             <a:avLst/>
           </a:prstGeom>
           <a:noFill/>
-          <a:ln w="12700">
+          <a:ln w="6350">
             <a:solidFill>
-              <a:schemeClr val="tx1">
-                <a:lumMod val="95000"/>
-                <a:lumOff val="5000"/>
+              <a:schemeClr val="bg1">
+                <a:lumMod val="50000"/>
               </a:schemeClr>
             </a:solidFill>
             <a:prstDash val="dash"/>
@@ -4549,11 +4612,10 @@
               <a:gd name="adj1" fmla="val 50000"/>
             </a:avLst>
           </a:prstGeom>
-          <a:ln w="12700">
+          <a:ln w="6350">
             <a:solidFill>
-              <a:schemeClr val="tx1">
-                <a:lumMod val="95000"/>
-                <a:lumOff val="5000"/>
+              <a:schemeClr val="bg1">
+                <a:lumMod val="50000"/>
               </a:schemeClr>
             </a:solidFill>
             <a:prstDash val="dash"/>
@@ -4594,11 +4656,10 @@
               <a:gd name="adj1" fmla="val 50000"/>
             </a:avLst>
           </a:prstGeom>
-          <a:ln w="12700">
+          <a:ln w="6350">
             <a:solidFill>
-              <a:schemeClr val="tx1">
-                <a:lumMod val="95000"/>
-                <a:lumOff val="5000"/>
+              <a:schemeClr val="bg1">
+                <a:lumMod val="50000"/>
               </a:schemeClr>
             </a:solidFill>
             <a:prstDash val="dash"/>
@@ -4639,11 +4700,10 @@
               <a:gd name="adj1" fmla="val 50000"/>
             </a:avLst>
           </a:prstGeom>
-          <a:ln w="12700">
+          <a:ln w="6350">
             <a:solidFill>
-              <a:schemeClr val="tx1">
-                <a:lumMod val="95000"/>
-                <a:lumOff val="5000"/>
+              <a:schemeClr val="bg1">
+                <a:lumMod val="50000"/>
               </a:schemeClr>
             </a:solidFill>
             <a:prstDash val="dash"/>
@@ -4682,11 +4742,10 @@
           <a:prstGeom prst="bentConnector2">
             <a:avLst/>
           </a:prstGeom>
-          <a:ln w="12700">
+          <a:ln w="6350">
             <a:solidFill>
-              <a:schemeClr val="tx1">
-                <a:lumMod val="95000"/>
-                <a:lumOff val="5000"/>
+              <a:schemeClr val="bg1">
+                <a:lumMod val="50000"/>
               </a:schemeClr>
             </a:solidFill>
             <a:prstDash val="dash"/>
@@ -4725,11 +4784,10 @@
           <a:prstGeom prst="bentConnector2">
             <a:avLst/>
           </a:prstGeom>
-          <a:ln w="12700">
+          <a:ln w="6350">
             <a:solidFill>
-              <a:schemeClr val="tx1">
-                <a:lumMod val="95000"/>
-                <a:lumOff val="5000"/>
+              <a:schemeClr val="bg1">
+                <a:lumMod val="50000"/>
               </a:schemeClr>
             </a:solidFill>
             <a:prstDash val="dash"/>
@@ -4770,11 +4828,10 @@
               <a:gd name="adj1" fmla="val 50000"/>
             </a:avLst>
           </a:prstGeom>
-          <a:ln w="12700">
+          <a:ln w="6350">
             <a:solidFill>
-              <a:schemeClr val="tx1">
-                <a:lumMod val="95000"/>
-                <a:lumOff val="5000"/>
+              <a:schemeClr val="bg1">
+                <a:lumMod val="50000"/>
               </a:schemeClr>
             </a:solidFill>
             <a:prstDash val="dash"/>
@@ -4815,11 +4872,10 @@
               <a:gd name="adj1" fmla="val 50000"/>
             </a:avLst>
           </a:prstGeom>
-          <a:ln w="12700">
+          <a:ln w="6350">
             <a:solidFill>
-              <a:schemeClr val="tx1">
-                <a:lumMod val="95000"/>
-                <a:lumOff val="5000"/>
+              <a:schemeClr val="bg1">
+                <a:lumMod val="50000"/>
               </a:schemeClr>
             </a:solidFill>
             <a:prstDash val="dash"/>
@@ -4860,11 +4916,10 @@
               <a:gd name="adj1" fmla="val 50000"/>
             </a:avLst>
           </a:prstGeom>
-          <a:ln w="12700">
+          <a:ln w="6350">
             <a:solidFill>
-              <a:schemeClr val="tx1">
-                <a:lumMod val="95000"/>
-                <a:lumOff val="5000"/>
+              <a:schemeClr val="bg1">
+                <a:lumMod val="50000"/>
               </a:schemeClr>
             </a:solidFill>
             <a:prstDash val="dash"/>
@@ -4905,11 +4960,10 @@
               <a:gd name="adj1" fmla="val 50000"/>
             </a:avLst>
           </a:prstGeom>
-          <a:ln w="12700">
+          <a:ln w="6350">
             <a:solidFill>
-              <a:schemeClr val="tx1">
-                <a:lumMod val="95000"/>
-                <a:lumOff val="5000"/>
+              <a:schemeClr val="bg1">
+                <a:lumMod val="50000"/>
               </a:schemeClr>
             </a:solidFill>
             <a:prstDash val="dash"/>
@@ -4950,11 +5004,10 @@
               <a:gd name="adj1" fmla="val 50000"/>
             </a:avLst>
           </a:prstGeom>
-          <a:ln w="12700">
+          <a:ln w="6350">
             <a:solidFill>
-              <a:schemeClr val="tx1">
-                <a:lumMod val="95000"/>
-                <a:lumOff val="5000"/>
+              <a:schemeClr val="bg1">
+                <a:lumMod val="50000"/>
               </a:schemeClr>
             </a:solidFill>
             <a:prstDash val="dash"/>
@@ -4995,11 +5048,10 @@
               <a:gd name="adj1" fmla="val 50000"/>
             </a:avLst>
           </a:prstGeom>
-          <a:ln w="12700">
+          <a:ln w="6350">
             <a:solidFill>
-              <a:schemeClr val="tx1">
-                <a:lumMod val="95000"/>
-                <a:lumOff val="5000"/>
+              <a:schemeClr val="bg1">
+                <a:lumMod val="50000"/>
               </a:schemeClr>
             </a:solidFill>
             <a:prstDash val="dash"/>
@@ -5038,11 +5090,10 @@
           <a:prstGeom prst="bentConnector2">
             <a:avLst/>
           </a:prstGeom>
-          <a:ln w="12700">
+          <a:ln w="6350">
             <a:solidFill>
-              <a:schemeClr val="tx1">
-                <a:lumMod val="95000"/>
-                <a:lumOff val="5000"/>
+              <a:schemeClr val="bg1">
+                <a:lumMod val="50000"/>
               </a:schemeClr>
             </a:solidFill>
             <a:prstDash val="dash"/>
@@ -5083,11 +5134,10 @@
               <a:gd name="adj1" fmla="val 50000"/>
             </a:avLst>
           </a:prstGeom>
-          <a:ln w="12700">
+          <a:ln w="6350">
             <a:solidFill>
-              <a:schemeClr val="tx1">
-                <a:lumMod val="95000"/>
-                <a:lumOff val="5000"/>
+              <a:schemeClr val="bg1">
+                <a:lumMod val="50000"/>
               </a:schemeClr>
             </a:solidFill>
             <a:prstDash val="dash"/>
@@ -5128,11 +5178,10 @@
               <a:gd name="adj1" fmla="val 50000"/>
             </a:avLst>
           </a:prstGeom>
-          <a:ln w="12700">
+          <a:ln w="6350">
             <a:solidFill>
-              <a:schemeClr val="tx1">
-                <a:lumMod val="95000"/>
-                <a:lumOff val="5000"/>
+              <a:schemeClr val="bg1">
+                <a:lumMod val="50000"/>
               </a:schemeClr>
             </a:solidFill>
             <a:prstDash val="dash"/>
@@ -5171,11 +5220,10 @@
           <a:prstGeom prst="bentConnector2">
             <a:avLst/>
           </a:prstGeom>
-          <a:ln w="12700">
+          <a:ln w="6350">
             <a:solidFill>
-              <a:schemeClr val="tx1">
-                <a:lumMod val="95000"/>
-                <a:lumOff val="5000"/>
+              <a:schemeClr val="bg1">
+                <a:lumMod val="50000"/>
               </a:schemeClr>
             </a:solidFill>
             <a:prstDash val="dash"/>
@@ -5214,11 +5262,10 @@
           <a:prstGeom prst="bentConnector2">
             <a:avLst/>
           </a:prstGeom>
-          <a:ln w="12700">
+          <a:ln w="6350">
             <a:solidFill>
-              <a:schemeClr val="tx1">
-                <a:lumMod val="95000"/>
-                <a:lumOff val="5000"/>
+              <a:schemeClr val="bg1">
+                <a:lumMod val="50000"/>
               </a:schemeClr>
             </a:solidFill>
             <a:prstDash val="dash"/>
@@ -5255,7 +5302,7 @@
             <a:avLst/>
           </a:prstGeom>
           <a:noFill/>
-          <a:ln>
+          <a:ln w="6350">
             <a:noFill/>
           </a:ln>
         </p:spPr>

</xml_diff>